<commit_message>
New module test for ESP8266, uses designed topic/msg
</commit_message>
<xml_diff>
--- a/Module Test/ESP8266/test_module.pptx
+++ b/Module Test/ESP8266/test_module.pptx
@@ -245,7 +245,7 @@
           <a:p>
             <a:fld id="{1D55B07B-5318-4CD0-B875-3612C319D3A0}" type="datetimeFigureOut">
               <a:rPr lang="en-US" smtClean="0"/>
-              <a:t>8/6/2025</a:t>
+              <a:t>8/12/2025</a:t>
             </a:fld>
             <a:endParaRPr lang="en-US"/>
           </a:p>
@@ -413,7 +413,7 @@
           <a:p>
             <a:fld id="{1D55B07B-5318-4CD0-B875-3612C319D3A0}" type="datetimeFigureOut">
               <a:rPr lang="en-US" smtClean="0"/>
-              <a:t>8/6/2025</a:t>
+              <a:t>8/12/2025</a:t>
             </a:fld>
             <a:endParaRPr lang="en-US"/>
           </a:p>
@@ -591,7 +591,7 @@
           <a:p>
             <a:fld id="{1D55B07B-5318-4CD0-B875-3612C319D3A0}" type="datetimeFigureOut">
               <a:rPr lang="en-US" smtClean="0"/>
-              <a:t>8/6/2025</a:t>
+              <a:t>8/12/2025</a:t>
             </a:fld>
             <a:endParaRPr lang="en-US"/>
           </a:p>
@@ -759,7 +759,7 @@
           <a:p>
             <a:fld id="{1D55B07B-5318-4CD0-B875-3612C319D3A0}" type="datetimeFigureOut">
               <a:rPr lang="en-US" smtClean="0"/>
-              <a:t>8/6/2025</a:t>
+              <a:t>8/12/2025</a:t>
             </a:fld>
             <a:endParaRPr lang="en-US"/>
           </a:p>
@@ -1004,7 +1004,7 @@
           <a:p>
             <a:fld id="{1D55B07B-5318-4CD0-B875-3612C319D3A0}" type="datetimeFigureOut">
               <a:rPr lang="en-US" smtClean="0"/>
-              <a:t>8/6/2025</a:t>
+              <a:t>8/12/2025</a:t>
             </a:fld>
             <a:endParaRPr lang="en-US"/>
           </a:p>
@@ -1233,7 +1233,7 @@
           <a:p>
             <a:fld id="{1D55B07B-5318-4CD0-B875-3612C319D3A0}" type="datetimeFigureOut">
               <a:rPr lang="en-US" smtClean="0"/>
-              <a:t>8/6/2025</a:t>
+              <a:t>8/12/2025</a:t>
             </a:fld>
             <a:endParaRPr lang="en-US"/>
           </a:p>
@@ -1597,7 +1597,7 @@
           <a:p>
             <a:fld id="{1D55B07B-5318-4CD0-B875-3612C319D3A0}" type="datetimeFigureOut">
               <a:rPr lang="en-US" smtClean="0"/>
-              <a:t>8/6/2025</a:t>
+              <a:t>8/12/2025</a:t>
             </a:fld>
             <a:endParaRPr lang="en-US"/>
           </a:p>
@@ -1714,7 +1714,7 @@
           <a:p>
             <a:fld id="{1D55B07B-5318-4CD0-B875-3612C319D3A0}" type="datetimeFigureOut">
               <a:rPr lang="en-US" smtClean="0"/>
-              <a:t>8/6/2025</a:t>
+              <a:t>8/12/2025</a:t>
             </a:fld>
             <a:endParaRPr lang="en-US"/>
           </a:p>
@@ -1809,7 +1809,7 @@
           <a:p>
             <a:fld id="{1D55B07B-5318-4CD0-B875-3612C319D3A0}" type="datetimeFigureOut">
               <a:rPr lang="en-US" smtClean="0"/>
-              <a:t>8/6/2025</a:t>
+              <a:t>8/12/2025</a:t>
             </a:fld>
             <a:endParaRPr lang="en-US"/>
           </a:p>
@@ -2084,7 +2084,7 @@
           <a:p>
             <a:fld id="{1D55B07B-5318-4CD0-B875-3612C319D3A0}" type="datetimeFigureOut">
               <a:rPr lang="en-US" smtClean="0"/>
-              <a:t>8/6/2025</a:t>
+              <a:t>8/12/2025</a:t>
             </a:fld>
             <a:endParaRPr lang="en-US"/>
           </a:p>
@@ -2336,7 +2336,7 @@
           <a:p>
             <a:fld id="{1D55B07B-5318-4CD0-B875-3612C319D3A0}" type="datetimeFigureOut">
               <a:rPr lang="en-US" smtClean="0"/>
-              <a:t>8/6/2025</a:t>
+              <a:t>8/12/2025</a:t>
             </a:fld>
             <a:endParaRPr lang="en-US"/>
           </a:p>
@@ -2547,7 +2547,7 @@
           <a:p>
             <a:fld id="{1D55B07B-5318-4CD0-B875-3612C319D3A0}" type="datetimeFigureOut">
               <a:rPr lang="en-US" smtClean="0"/>
-              <a:t>8/6/2025</a:t>
+              <a:t>8/12/2025</a:t>
             </a:fld>
             <a:endParaRPr lang="en-US"/>
           </a:p>

</xml_diff>